<commit_message>
Added report's C++ section
</commit_message>
<xml_diff>
--- a/final results/Relazione.pptx
+++ b/final results/Relazione.pptx
@@ -715,6 +715,7 @@
     </c:legend>
     <c:plotVisOnly val="1"/>
     <c:dispBlanksAs val="zero"/>
+    <c:showDLblsOverMax val="0"/>
     <c:extLst>
       <c:ext xmlns:c16r3="http://schemas.microsoft.com/office/drawing/2017/03/chart" uri="{56B9EC1D-385E-4148-901F-78D8002777C0}">
         <c16r3:dataDisplayOptions16>
@@ -722,7 +723,6 @@
         </c16r3:dataDisplayOptions16>
       </c:ext>
     </c:extLst>
-    <c:showDLblsOverMax val="0"/>
   </c:chart>
   <c:spPr>
     <a:solidFill>
@@ -1321,6 +1321,7 @@
     </c:legend>
     <c:plotVisOnly val="1"/>
     <c:dispBlanksAs val="gap"/>
+    <c:showDLblsOverMax val="0"/>
     <c:extLst>
       <c:ext xmlns:c16r3="http://schemas.microsoft.com/office/drawing/2017/03/chart" uri="{56B9EC1D-385E-4148-901F-78D8002777C0}">
         <c16r3:dataDisplayOptions16>
@@ -1328,7 +1329,6 @@
         </c16r3:dataDisplayOptions16>
       </c:ext>
     </c:extLst>
-    <c:showDLblsOverMax val="0"/>
   </c:chart>
   <c:spPr>
     <a:solidFill>
@@ -1982,6 +1982,7 @@
     </c:legend>
     <c:plotVisOnly val="1"/>
     <c:dispBlanksAs val="gap"/>
+    <c:showDLblsOverMax val="0"/>
     <c:extLst>
       <c:ext xmlns:c16r3="http://schemas.microsoft.com/office/drawing/2017/03/chart" uri="{56B9EC1D-385E-4148-901F-78D8002777C0}">
         <c16r3:dataDisplayOptions16>
@@ -1989,7 +1990,6 @@
         </c16r3:dataDisplayOptions16>
       </c:ext>
     </c:extLst>
-    <c:showDLblsOverMax val="0"/>
   </c:chart>
   <c:spPr>
     <a:solidFill>
@@ -2648,6 +2648,7 @@
     </c:legend>
     <c:plotVisOnly val="1"/>
     <c:dispBlanksAs val="gap"/>
+    <c:showDLblsOverMax val="0"/>
     <c:extLst>
       <c:ext xmlns:c16r3="http://schemas.microsoft.com/office/drawing/2017/03/chart" uri="{56B9EC1D-385E-4148-901F-78D8002777C0}">
         <c16r3:dataDisplayOptions16>
@@ -2655,7 +2656,6 @@
         </c16r3:dataDisplayOptions16>
       </c:ext>
     </c:extLst>
-    <c:showDLblsOverMax val="0"/>
   </c:chart>
   <c:spPr>
     <a:solidFill>
@@ -3317,6 +3317,7 @@
     </c:legend>
     <c:plotVisOnly val="1"/>
     <c:dispBlanksAs val="zero"/>
+    <c:showDLblsOverMax val="0"/>
     <c:extLst>
       <c:ext xmlns:c16r3="http://schemas.microsoft.com/office/drawing/2017/03/chart" uri="{56B9EC1D-385E-4148-901F-78D8002777C0}">
         <c16r3:dataDisplayOptions16>
@@ -3324,7 +3325,6 @@
         </c16r3:dataDisplayOptions16>
       </c:ext>
     </c:extLst>
-    <c:showDLblsOverMax val="0"/>
   </c:chart>
   <c:spPr>
     <a:solidFill>
@@ -3978,6 +3978,7 @@
     </c:legend>
     <c:plotVisOnly val="1"/>
     <c:dispBlanksAs val="gap"/>
+    <c:showDLblsOverMax val="0"/>
     <c:extLst>
       <c:ext xmlns:c16r3="http://schemas.microsoft.com/office/drawing/2017/03/chart" uri="{56B9EC1D-385E-4148-901F-78D8002777C0}">
         <c16r3:dataDisplayOptions16>
@@ -3985,7 +3986,6 @@
         </c16r3:dataDisplayOptions16>
       </c:ext>
     </c:extLst>
-    <c:showDLblsOverMax val="0"/>
   </c:chart>
   <c:spPr>
     <a:solidFill>
@@ -4639,6 +4639,7 @@
     </c:legend>
     <c:plotVisOnly val="1"/>
     <c:dispBlanksAs val="gap"/>
+    <c:showDLblsOverMax val="0"/>
     <c:extLst>
       <c:ext xmlns:c16r3="http://schemas.microsoft.com/office/drawing/2017/03/chart" uri="{56B9EC1D-385E-4148-901F-78D8002777C0}">
         <c16r3:dataDisplayOptions16>
@@ -4646,7 +4647,6 @@
         </c16r3:dataDisplayOptions16>
       </c:ext>
     </c:extLst>
-    <c:showDLblsOverMax val="0"/>
   </c:chart>
   <c:spPr>
     <a:solidFill>
@@ -8559,7 +8559,7 @@
             <a:pPr rtl="0"/>
             <a:fld id="{3CC097E2-C1A8-45B5-8DD2-EA6696F7EE1C}" type="datetime1">
               <a:rPr lang="it-IT" smtClean="0"/>
-              <a:t>11/05/2020</a:t>
+              <a:t>16/05/2020</a:t>
             </a:fld>
             <a:endParaRPr lang="it-IT" dirty="0"/>
           </a:p>
@@ -8729,7 +8729,7 @@
             <a:fld id="{7F9C49DA-EF53-46E1-8D2F-E5AD170D68F7}" type="datetime1">
               <a:rPr lang="it-IT" smtClean="0"/>
               <a:pPr/>
-              <a:t>11/05/2020</a:t>
+              <a:t>16/05/2020</a:t>
             </a:fld>
             <a:endParaRPr lang="it-IT" dirty="0"/>
           </a:p>
@@ -9683,7 +9683,7 @@
             <a:pPr rtl="0"/>
             <a:fld id="{E4973A7A-4209-43E9-99B3-6B59C9756F91}" type="datetime1">
               <a:rPr lang="it-IT" smtClean="0"/>
-              <a:t>11/05/2020</a:t>
+              <a:t>16/05/2020</a:t>
             </a:fld>
             <a:endParaRPr lang="it-IT" dirty="0"/>
           </a:p>
@@ -9886,7 +9886,7 @@
             <a:pPr rtl="0"/>
             <a:fld id="{B78B0084-E10E-4817-BDAE-932E8737945B}" type="datetime1">
               <a:rPr lang="it-IT" smtClean="0"/>
-              <a:t>11/05/2020</a:t>
+              <a:t>16/05/2020</a:t>
             </a:fld>
             <a:endParaRPr lang="it-IT" dirty="0"/>
           </a:p>
@@ -10164,7 +10164,7 @@
             <a:fld id="{2D37122F-874F-48B2-ACE2-0E33110ED286}" type="datetime1">
               <a:rPr lang="it-IT" smtClean="0"/>
               <a:pPr/>
-              <a:t>11/05/2020</a:t>
+              <a:t>16/05/2020</a:t>
             </a:fld>
             <a:endParaRPr lang="it-IT" dirty="0"/>
           </a:p>
@@ -10360,7 +10360,7 @@
             <a:pPr rtl="0"/>
             <a:fld id="{0FAF0824-C3FA-4EB7-BB72-C75DA1716884}" type="datetime1">
               <a:rPr lang="it-IT" smtClean="0"/>
-              <a:t>11/05/2020</a:t>
+              <a:t>16/05/2020</a:t>
             </a:fld>
             <a:endParaRPr lang="it-IT" dirty="0"/>
           </a:p>
@@ -10746,7 +10746,7 @@
             <a:pPr rtl="0"/>
             <a:fld id="{E0464D3B-8E25-4DB1-84E0-219829AEE0E1}" type="datetime1">
               <a:rPr lang="it-IT" smtClean="0"/>
-              <a:t>11/05/2020</a:t>
+              <a:t>16/05/2020</a:t>
             </a:fld>
             <a:endParaRPr lang="it-IT" dirty="0"/>
           </a:p>
@@ -11011,7 +11011,7 @@
             <a:pPr rtl="0"/>
             <a:fld id="{530E296F-8CE9-430C-9F53-13A1C8C5EC41}" type="datetime1">
               <a:rPr lang="it-IT" smtClean="0"/>
-              <a:t>11/05/2020</a:t>
+              <a:t>16/05/2020</a:t>
             </a:fld>
             <a:endParaRPr lang="it-IT" dirty="0"/>
           </a:p>
@@ -11389,7 +11389,7 @@
             <a:pPr rtl="0"/>
             <a:fld id="{4999F434-6DF7-466A-AAC9-9DD2C29A434C}" type="datetime1">
               <a:rPr lang="it-IT" smtClean="0"/>
-              <a:t>11/05/2020</a:t>
+              <a:t>16/05/2020</a:t>
             </a:fld>
             <a:endParaRPr lang="it-IT" dirty="0"/>
           </a:p>
@@ -11523,7 +11523,7 @@
             <a:pPr rtl="0"/>
             <a:fld id="{055B652D-F48B-4BAB-8291-7C3A3D6531D8}" type="datetime1">
               <a:rPr lang="it-IT" smtClean="0"/>
-              <a:t>11/05/2020</a:t>
+              <a:t>16/05/2020</a:t>
             </a:fld>
             <a:endParaRPr lang="it-IT" dirty="0"/>
           </a:p>
@@ -11633,7 +11633,7 @@
             <a:pPr rtl="0"/>
             <a:fld id="{40691292-BC42-4503-BCF0-54DC7A09D527}" type="datetime1">
               <a:rPr lang="it-IT" smtClean="0"/>
-              <a:t>11/05/2020</a:t>
+              <a:t>16/05/2020</a:t>
             </a:fld>
             <a:endParaRPr lang="it-IT" dirty="0"/>
           </a:p>
@@ -11930,7 +11930,7 @@
             <a:pPr rtl="0"/>
             <a:fld id="{DA59007C-71C1-45B6-9C08-D6C2086C0629}" type="datetime1">
               <a:rPr lang="it-IT" smtClean="0"/>
-              <a:t>11/05/2020</a:t>
+              <a:t>16/05/2020</a:t>
             </a:fld>
             <a:endParaRPr lang="it-IT" dirty="0"/>
           </a:p>
@@ -12205,7 +12205,7 @@
             <a:pPr rtl="0"/>
             <a:fld id="{C9604D06-2BD0-44B1-AD13-FD755D153433}" type="datetime1">
               <a:rPr lang="it-IT" smtClean="0"/>
-              <a:t>11/05/2020</a:t>
+              <a:t>16/05/2020</a:t>
             </a:fld>
             <a:endParaRPr lang="it-IT" dirty="0"/>
           </a:p>
@@ -12531,7 +12531,7 @@
             <a:fld id="{50F62044-751B-41C8-9D85-1AB1BCC2C196}" type="datetime1">
               <a:rPr lang="it-IT" smtClean="0"/>
               <a:pPr/>
-              <a:t>11/05/2020</a:t>
+              <a:t>16/05/2020</a:t>
             </a:fld>
             <a:endParaRPr lang="it-IT" dirty="0"/>
           </a:p>
@@ -14243,10 +14243,124 @@
           <a:bodyPr/>
           <a:lstStyle/>
           <a:p>
-            <a:endParaRPr lang="it-IT"/>
+            <a:r>
+              <a:rPr lang="it-IT" dirty="0" smtClean="0"/>
+              <a:t>Libreria scelta: </a:t>
+            </a:r>
+            <a:r>
+              <a:rPr lang="it-IT" dirty="0" err="1" smtClean="0"/>
+              <a:t>Eigen</a:t>
+            </a:r>
+            <a:r>
+              <a:rPr lang="it-IT" dirty="0" smtClean="0"/>
+              <a:t>.</a:t>
+            </a:r>
+          </a:p>
+          <a:p>
+            <a:r>
+              <a:rPr lang="it-IT" dirty="0" smtClean="0"/>
+              <a:t>I passi dell’analisi seguono lo schema utilizzato per MATLAB, con alcune complicazioni riguardo:</a:t>
+            </a:r>
+          </a:p>
+          <a:p>
+            <a:pPr marL="914400" lvl="1" indent="-457200">
+              <a:buFont typeface="+mj-lt"/>
+              <a:buAutoNum type="arabicPeriod"/>
+            </a:pPr>
+            <a:r>
+              <a:rPr lang="it-IT" dirty="0" smtClean="0"/>
+              <a:t>Caricamento a memoria della matrice: scrittura di un metodo ad-hoc per matrici Matrix Market.</a:t>
+            </a:r>
+          </a:p>
+          <a:p>
+            <a:pPr marL="914400" lvl="1" indent="-457200">
+              <a:buFont typeface="+mj-lt"/>
+              <a:buAutoNum type="arabicPeriod"/>
+            </a:pPr>
+            <a:r>
+              <a:rPr lang="it-IT" dirty="0" smtClean="0"/>
+              <a:t>Spazio in memoria utilizzato: calcolo empirico sfruttando la struttura CSC/CSR</a:t>
+            </a:r>
+          </a:p>
+          <a:p>
+            <a:pPr marL="457200" lvl="1" indent="0">
+              <a:buNone/>
+            </a:pPr>
+            <a:endParaRPr lang="it-IT" dirty="0" smtClean="0"/>
+          </a:p>
+          <a:p>
+            <a:r>
+              <a:rPr lang="it-IT" dirty="0" smtClean="0"/>
+              <a:t>Risultati peggiori in termini di tempo di calcolo della decomposizione </a:t>
+            </a:r>
+            <a:r>
+              <a:rPr lang="it-IT" dirty="0" err="1" smtClean="0"/>
+              <a:t>Cholesky</a:t>
+            </a:r>
+            <a:r>
+              <a:rPr lang="it-IT" dirty="0" smtClean="0"/>
+              <a:t>, causato dalla natura single-core di </a:t>
+            </a:r>
+            <a:r>
+              <a:rPr lang="it-IT" dirty="0" err="1" smtClean="0"/>
+              <a:t>Eigen</a:t>
+            </a:r>
+            <a:r>
+              <a:rPr lang="it-IT" dirty="0" smtClean="0"/>
+              <a:t>. I tempi sarebbero migliorabili utilizzando il modulo per il supporto a </a:t>
+            </a:r>
+            <a:r>
+              <a:rPr lang="it-IT" dirty="0" err="1" smtClean="0"/>
+              <a:t>PaStiX</a:t>
+            </a:r>
+            <a:r>
+              <a:rPr lang="it-IT" dirty="0" smtClean="0"/>
+              <a:t> o </a:t>
+            </a:r>
+            <a:r>
+              <a:rPr lang="it-IT" dirty="0" err="1" smtClean="0"/>
+              <a:t>ParadisoMKT</a:t>
+            </a:r>
+            <a:r>
+              <a:rPr lang="it-IT" dirty="0" smtClean="0"/>
+              <a:t>.</a:t>
+            </a:r>
+          </a:p>
+          <a:p>
+            <a:endParaRPr lang="it-IT" dirty="0"/>
           </a:p>
         </p:txBody>
       </p:sp>
+      <p:pic>
+        <p:nvPicPr>
+          <p:cNvPr id="5" name="Immagine 4"/>
+          <p:cNvPicPr>
+            <a:picLocks noChangeAspect="1"/>
+          </p:cNvPicPr>
+          <p:nvPr/>
+        </p:nvPicPr>
+        <p:blipFill>
+          <a:blip r:embed="rId2">
+            <a:extLst>
+              <a:ext uri="{28A0092B-C50C-407E-A947-70E740481C1C}">
+                <a14:useLocalDpi xmlns:a14="http://schemas.microsoft.com/office/drawing/2010/main" val="0"/>
+              </a:ext>
+            </a:extLst>
+          </a:blip>
+          <a:stretch>
+            <a:fillRect/>
+          </a:stretch>
+        </p:blipFill>
+        <p:spPr>
+          <a:xfrm>
+            <a:off x="2273507" y="4493710"/>
+            <a:ext cx="8013941" cy="218960"/>
+          </a:xfrm>
+          <a:prstGeom prst="rect">
+            <a:avLst/>
+          </a:prstGeom>
+        </p:spPr>
+      </p:pic>
     </p:spTree>
     <p:extLst>
       <p:ext uri="{BB962C8B-B14F-4D97-AF65-F5344CB8AC3E}">

</xml_diff>